<commit_message>
mise en forme + conclusion/perspectives
</commit_message>
<xml_diff>
--- a/Presentation v0.3.pptx
+++ b/Presentation v0.3.pptx
@@ -5,7 +5,7 @@
     <p:sldMasterId id="2147483720" r:id="rId1"/>
   </p:sldMasterIdLst>
   <p:notesMasterIdLst>
-    <p:notesMasterId r:id="rId30"/>
+    <p:notesMasterId r:id="rId32"/>
   </p:notesMasterIdLst>
   <p:sldIdLst>
     <p:sldId id="256" r:id="rId2"/>
@@ -33,9 +33,11 @@
     <p:sldId id="285" r:id="rId24"/>
     <p:sldId id="286" r:id="rId25"/>
     <p:sldId id="287" r:id="rId26"/>
-    <p:sldId id="288" r:id="rId27"/>
-    <p:sldId id="289" r:id="rId28"/>
-    <p:sldId id="290" r:id="rId29"/>
+    <p:sldId id="292" r:id="rId27"/>
+    <p:sldId id="291" r:id="rId28"/>
+    <p:sldId id="288" r:id="rId29"/>
+    <p:sldId id="289" r:id="rId30"/>
+    <p:sldId id="290" r:id="rId31"/>
   </p:sldIdLst>
   <p:sldSz cx="9144000" cy="5143500" type="screen16x9"/>
   <p:notesSz cx="6858000" cy="9144000"/>
@@ -5718,10 +5720,10 @@
               <a:p>
                 <a:pPr algn="ctr"/>
                 <a:r>
-                  <a:rPr lang="fr-FR" dirty="0" smtClean="0"/>
+                  <a:rPr lang="fr-FR" sz="1400" dirty="0" smtClean="0"/>
                   <a:t>Moyenne par heure</a:t>
                 </a:r>
-                <a:endParaRPr lang="en-US" dirty="0"/>
+                <a:endParaRPr lang="en-US" sz="1400" dirty="0"/>
               </a:p>
             </p:txBody>
           </p:sp>
@@ -5768,24 +5770,31 @@
               <a:p>
                 <a:pPr algn="ctr"/>
                 <a:r>
-                  <a:rPr lang="fr-FR" dirty="0" smtClean="0"/>
+                  <a:rPr lang="fr-FR" sz="1400" dirty="0" smtClean="0"/>
                   <a:t>Ajout colonnes</a:t>
                 </a:r>
               </a:p>
               <a:p>
                 <a:pPr algn="ctr"/>
                 <a:r>
-                  <a:rPr lang="fr-FR" dirty="0" smtClean="0"/>
+                  <a:rPr lang="fr-FR" sz="1400" dirty="0" smtClean="0"/>
                   <a:t>h-X</a:t>
                 </a:r>
               </a:p>
               <a:p>
                 <a:pPr algn="ctr"/>
                 <a:r>
-                  <a:rPr lang="fr-FR" dirty="0" smtClean="0"/>
+                  <a:rPr lang="fr-FR" sz="1400" dirty="0" smtClean="0"/>
                   <a:t>j-7</a:t>
                 </a:r>
-                <a:endParaRPr lang="en-US" dirty="0"/>
+              </a:p>
+              <a:p>
+                <a:pPr algn="ctr"/>
+                <a:r>
+                  <a:rPr lang="fr-FR" sz="1400" dirty="0" smtClean="0"/>
+                  <a:t>(pas météo)</a:t>
+                </a:r>
+                <a:endParaRPr lang="en-US" sz="1400" dirty="0"/>
               </a:p>
             </p:txBody>
           </p:sp>
@@ -5874,7 +5883,7 @@
               <a:p>
                 <a:pPr algn="ctr"/>
                 <a:r>
-                  <a:rPr lang="fr-FR" dirty="0" smtClean="0"/>
+                  <a:rPr lang="fr-FR" sz="1400" dirty="0" smtClean="0"/>
                   <a:t>Séparation données</a:t>
                 </a:r>
               </a:p>
@@ -5884,14 +5893,14 @@
                   <a:buChar char="§"/>
                 </a:pPr>
                 <a:r>
-                  <a:rPr lang="fr-FR" dirty="0" smtClean="0"/>
+                  <a:rPr lang="fr-FR" sz="1400" dirty="0" smtClean="0"/>
                   <a:t>pré:   t&lt;</a:t>
                 </a:r>
                 <a:r>
-                  <a:rPr lang="fr-FR" dirty="0" err="1" smtClean="0"/>
+                  <a:rPr lang="fr-FR" sz="1400" dirty="0" err="1" smtClean="0"/>
                   <a:t>Date+H</a:t>
                 </a:r>
-                <a:endParaRPr lang="fr-FR" dirty="0" smtClean="0"/>
+                <a:endParaRPr lang="fr-FR" sz="1400" dirty="0" smtClean="0"/>
               </a:p>
               <a:p>
                 <a:pPr marL="285750" indent="-285750">
@@ -5899,14 +5908,14 @@
                   <a:buChar char="§"/>
                 </a:pPr>
                 <a:r>
-                  <a:rPr lang="fr-FR" dirty="0" smtClean="0"/>
+                  <a:rPr lang="fr-FR" sz="1400" dirty="0" smtClean="0"/>
                   <a:t>post: t&gt;</a:t>
                 </a:r>
                 <a:r>
-                  <a:rPr lang="fr-FR" dirty="0" err="1" smtClean="0"/>
+                  <a:rPr lang="fr-FR" sz="1400" dirty="0" err="1" smtClean="0"/>
                   <a:t>Date+H</a:t>
                 </a:r>
-                <a:endParaRPr lang="en-US" dirty="0"/>
+                <a:endParaRPr lang="en-US" sz="1400" dirty="0"/>
               </a:p>
             </p:txBody>
           </p:sp>
@@ -6564,8 +6573,8 @@
         </p:nvSpPr>
         <p:spPr>
           <a:xfrm>
-            <a:off x="5553368" y="4299942"/>
-            <a:ext cx="3266343" cy="369332"/>
+            <a:off x="5568949" y="4299942"/>
+            <a:ext cx="3235181" cy="307777"/>
           </a:xfrm>
           <a:prstGeom prst="rect">
             <a:avLst/>
@@ -6580,10 +6589,14 @@
           <a:p>
             <a:pPr algn="ctr"/>
             <a:r>
-              <a:rPr lang="fr-FR" dirty="0" smtClean="0"/>
-              <a:t>Utilisé pour faire de la prédiction</a:t>
-            </a:r>
-            <a:endParaRPr lang="en-US" dirty="0"/>
+              <a:rPr lang="fr-FR" sz="1400" dirty="0" smtClean="0"/>
+              <a:t>Utilisées </a:t>
+            </a:r>
+            <a:r>
+              <a:rPr lang="fr-FR" sz="1400" dirty="0" smtClean="0"/>
+              <a:t>pour faire de la prédiction</a:t>
+            </a:r>
+            <a:endParaRPr lang="en-US" sz="1400" dirty="0"/>
           </a:p>
         </p:txBody>
       </p:sp>
@@ -6595,8 +6608,8 @@
         </p:nvSpPr>
         <p:spPr>
           <a:xfrm>
-            <a:off x="403920" y="4332133"/>
-            <a:ext cx="4909677" cy="1200329"/>
+            <a:off x="498176" y="4168700"/>
+            <a:ext cx="4721164" cy="738664"/>
           </a:xfrm>
           <a:prstGeom prst="rect">
             <a:avLst/>
@@ -6611,35 +6624,44 @@
           <a:p>
             <a:pPr algn="ctr"/>
             <a:r>
-              <a:rPr lang="fr-FR" dirty="0" smtClean="0"/>
-              <a:t>Utilisé pour la modélisation</a:t>
+              <a:rPr lang="fr-FR" sz="1400" dirty="0" smtClean="0"/>
+              <a:t>Utilisées </a:t>
+            </a:r>
+            <a:r>
+              <a:rPr lang="fr-FR" sz="1400" dirty="0" smtClean="0"/>
+              <a:t>pour la modélisation</a:t>
             </a:r>
             <a:br>
-              <a:rPr lang="fr-FR" dirty="0" smtClean="0"/>
+              <a:rPr lang="fr-FR" sz="1400" dirty="0" smtClean="0"/>
             </a:br>
             <a:r>
-              <a:rPr lang="fr-FR" dirty="0" smtClean="0"/>
+              <a:rPr lang="fr-FR" sz="1400" dirty="0" smtClean="0"/>
               <a:t>(validation croisée pour optimiser chaque modèle,</a:t>
             </a:r>
           </a:p>
           <a:p>
             <a:pPr algn="ctr"/>
             <a:r>
-              <a:rPr lang="fr-FR" dirty="0" smtClean="0"/>
+              <a:rPr lang="fr-FR" sz="1400" dirty="0" smtClean="0"/>
               <a:t>Validation </a:t>
             </a:r>
             <a:r>
-              <a:rPr lang="fr-FR" dirty="0" err="1" smtClean="0"/>
+              <a:rPr lang="fr-FR" sz="1400" dirty="0" err="1" smtClean="0"/>
               <a:t>hold</a:t>
             </a:r>
             <a:r>
-              <a:rPr lang="fr-FR" dirty="0" smtClean="0"/>
-              <a:t> pour choisir le meilleur modèle)</a:t>
-            </a:r>
-            <a:br>
-              <a:rPr lang="fr-FR" dirty="0" smtClean="0"/>
-            </a:br>
-            <a:endParaRPr lang="en-US" dirty="0"/>
+              <a:rPr lang="fr-FR" sz="1400" dirty="0" smtClean="0"/>
+              <a:t>-out </a:t>
+            </a:r>
+            <a:r>
+              <a:rPr lang="fr-FR" sz="1400" dirty="0" smtClean="0"/>
+              <a:t>pour choisir le meilleur modèle</a:t>
+            </a:r>
+            <a:r>
+              <a:rPr lang="fr-FR" sz="1400" dirty="0" smtClean="0"/>
+              <a:t>)</a:t>
+            </a:r>
+            <a:endParaRPr lang="en-US" sz="1400" dirty="0"/>
           </a:p>
         </p:txBody>
       </p:sp>
@@ -6795,13 +6817,26 @@
         <p:spPr/>
         <p:txBody>
           <a:bodyPr>
-            <a:normAutofit lnSpcReduction="10000"/>
+            <a:normAutofit fontScale="92500" lnSpcReduction="20000"/>
           </a:bodyPr>
           <a:lstStyle/>
           <a:p>
             <a:r>
               <a:rPr lang="fr-FR" sz="2000" b="1" u="sng" dirty="0" smtClean="0"/>
-              <a:t>Classification binaire:  </a:t>
+              <a:t>On travaille sur les données moyennées par heure</a:t>
+            </a:r>
+          </a:p>
+          <a:p>
+            <a:endParaRPr lang="fr-FR" sz="2000" b="1" u="sng" dirty="0" smtClean="0"/>
+          </a:p>
+          <a:p>
+            <a:r>
+              <a:rPr lang="fr-FR" sz="2000" b="1" u="sng" dirty="0" smtClean="0"/>
+              <a:t>Classification </a:t>
+            </a:r>
+            <a:r>
+              <a:rPr lang="fr-FR" sz="2000" b="1" u="sng" dirty="0" smtClean="0"/>
+              <a:t>binaire:  </a:t>
             </a:r>
             <a:r>
               <a:rPr lang="fr-FR" sz="2000" dirty="0" smtClean="0"/>
@@ -6939,7 +6974,13 @@
               <a:rPr lang="fr-FR" sz="1800" dirty="0" smtClean="0">
                 <a:sym typeface="Wingdings" panose="05000000000000000000" pitchFamily="2" charset="2"/>
               </a:rPr>
-              <a:t> réduction du nombre de dimension arbitraire</a:t>
+              <a:t> réduction du nombre de dimension </a:t>
+            </a:r>
+            <a:r>
+              <a:rPr lang="fr-FR" sz="1800" dirty="0" smtClean="0">
+                <a:sym typeface="Wingdings" panose="05000000000000000000" pitchFamily="2" charset="2"/>
+              </a:rPr>
+              <a:t>arbitraire  pas testé </a:t>
             </a:r>
             <a:endParaRPr lang="en-US" sz="1800" dirty="0"/>
           </a:p>
@@ -8278,6 +8319,90 @@
           </a:extLst>
         </p:spPr>
       </p:pic>
+      <p:sp>
+        <p:nvSpPr>
+          <p:cNvPr id="3" name="Rectangle 2"/>
+          <p:cNvSpPr/>
+          <p:nvPr/>
+        </p:nvSpPr>
+        <p:spPr>
+          <a:xfrm>
+            <a:off x="1331640" y="1275606"/>
+            <a:ext cx="7272808" cy="936104"/>
+          </a:xfrm>
+          <a:prstGeom prst="rect">
+            <a:avLst/>
+          </a:prstGeom>
+          <a:noFill/>
+          <a:ln>
+            <a:solidFill>
+              <a:srgbClr val="FF0000"/>
+            </a:solidFill>
+          </a:ln>
+        </p:spPr>
+        <p:style>
+          <a:lnRef idx="2">
+            <a:schemeClr val="accent1">
+              <a:shade val="50000"/>
+            </a:schemeClr>
+          </a:lnRef>
+          <a:fillRef idx="1">
+            <a:schemeClr val="accent1"/>
+          </a:fillRef>
+          <a:effectRef idx="0">
+            <a:schemeClr val="accent1"/>
+          </a:effectRef>
+          <a:fontRef idx="minor">
+            <a:schemeClr val="lt1"/>
+          </a:fontRef>
+        </p:style>
+        <p:txBody>
+          <a:bodyPr rtlCol="0" anchor="ctr"/>
+          <a:lstStyle/>
+          <a:p>
+            <a:pPr algn="ctr"/>
+            <a:endParaRPr lang="en-US"/>
+          </a:p>
+        </p:txBody>
+      </p:sp>
+      <p:sp>
+        <p:nvSpPr>
+          <p:cNvPr id="4" name="TextBox 3"/>
+          <p:cNvSpPr txBox="1"/>
+          <p:nvPr/>
+        </p:nvSpPr>
+        <p:spPr>
+          <a:xfrm>
+            <a:off x="6804248" y="1288282"/>
+            <a:ext cx="1678665" cy="369332"/>
+          </a:xfrm>
+          <a:prstGeom prst="rect">
+            <a:avLst/>
+          </a:prstGeom>
+          <a:noFill/>
+        </p:spPr>
+        <p:txBody>
+          <a:bodyPr wrap="none" rtlCol="0">
+            <a:spAutoFit/>
+          </a:bodyPr>
+          <a:lstStyle/>
+          <a:p>
+            <a:r>
+              <a:rPr lang="fr-FR" dirty="0" smtClean="0">
+                <a:solidFill>
+                  <a:srgbClr val="FF0000"/>
+                </a:solidFill>
+              </a:rPr>
+              <a:t>Pas de météo</a:t>
+            </a:r>
+            <a:endParaRPr lang="en-US" dirty="0">
+              <a:solidFill>
+                <a:srgbClr val="FF0000"/>
+              </a:solidFill>
+            </a:endParaRPr>
+          </a:p>
+        </p:txBody>
+      </p:sp>
     </p:spTree>
     <p:extLst>
       <p:ext uri="{BB962C8B-B14F-4D97-AF65-F5344CB8AC3E}">
@@ -8357,7 +8482,7 @@
         <p:spPr>
           <a:xfrm>
             <a:off x="457200" y="1200151"/>
-            <a:ext cx="8229600" cy="3394472"/>
+            <a:ext cx="8579296" cy="3394472"/>
           </a:xfrm>
         </p:spPr>
         <p:txBody>
@@ -8459,7 +8584,7 @@
         <p:spPr>
           <a:xfrm>
             <a:off x="6084168" y="2441721"/>
-            <a:ext cx="2797304" cy="369332"/>
+            <a:ext cx="2664512" cy="307777"/>
           </a:xfrm>
           <a:prstGeom prst="rect">
             <a:avLst/>
@@ -8478,22 +8603,22 @@
           <a:lstStyle/>
           <a:p>
             <a:r>
-              <a:rPr lang="fr-FR" dirty="0" smtClean="0"/>
+              <a:rPr lang="fr-FR" sz="1400" dirty="0" smtClean="0"/>
               <a:t>choix </a:t>
             </a:r>
             <a:r>
-              <a:rPr lang="fr-FR" dirty="0" err="1" smtClean="0"/>
+              <a:rPr lang="fr-FR" sz="1400" dirty="0" err="1" smtClean="0"/>
               <a:t>ridge</a:t>
             </a:r>
             <a:r>
-              <a:rPr lang="fr-FR" dirty="0" smtClean="0"/>
+              <a:rPr lang="fr-FR" sz="1400" dirty="0" smtClean="0"/>
               <a:t>, lasso, </a:t>
             </a:r>
             <a:r>
-              <a:rPr lang="fr-FR" dirty="0" err="1" smtClean="0"/>
+              <a:rPr lang="fr-FR" sz="1400" dirty="0" err="1" smtClean="0"/>
               <a:t>elasticnet</a:t>
             </a:r>
-            <a:endParaRPr lang="en-US" dirty="0"/>
+            <a:endParaRPr lang="en-US" sz="1400" dirty="0"/>
           </a:p>
         </p:txBody>
       </p:sp>
@@ -8507,8 +8632,8 @@
         </p:nvCxnSpPr>
         <p:spPr>
           <a:xfrm flipH="1">
-            <a:off x="4139952" y="2626387"/>
-            <a:ext cx="1944216" cy="449419"/>
+            <a:off x="4139952" y="2595610"/>
+            <a:ext cx="1944216" cy="480196"/>
           </a:xfrm>
           <a:prstGeom prst="straightConnector1">
             <a:avLst/>
@@ -10992,7 +11117,7 @@
         <p:spPr>
           <a:xfrm>
             <a:off x="5604983" y="2398184"/>
-            <a:ext cx="3071473" cy="646331"/>
+            <a:ext cx="3071473" cy="830997"/>
           </a:xfrm>
           <a:prstGeom prst="rect">
             <a:avLst/>
@@ -11011,10 +11136,10 @@
           <a:lstStyle/>
           <a:p>
             <a:r>
-              <a:rPr lang="fr-FR" dirty="0" smtClean="0"/>
+              <a:rPr lang="fr-FR" sz="1600" dirty="0" smtClean="0"/>
               <a:t>Optimisation du paramètre de cout par validation croisée</a:t>
             </a:r>
-            <a:endParaRPr lang="en-US" dirty="0"/>
+            <a:endParaRPr lang="en-US" sz="1600" dirty="0"/>
           </a:p>
         </p:txBody>
       </p:sp>
@@ -11028,8 +11153,8 @@
         </p:nvCxnSpPr>
         <p:spPr>
           <a:xfrm flipH="1">
-            <a:off x="3609001" y="2721350"/>
-            <a:ext cx="1995982" cy="352863"/>
+            <a:off x="3609001" y="2813683"/>
+            <a:ext cx="1995982" cy="260530"/>
           </a:xfrm>
           <a:prstGeom prst="straightConnector1">
             <a:avLst/>
@@ -12740,9 +12865,19 @@
             </a:r>
             <a:r>
               <a:rPr lang="fr-FR" sz="1800" dirty="0" smtClean="0"/>
-              <a:t>8h    (&lt;2016/12/31)</a:t>
-            </a:r>
-            <a:endParaRPr lang="fr-FR" sz="1800" dirty="0"/>
+              <a:t>8h    (&lt;2016/12/31</a:t>
+            </a:r>
+            <a:r>
+              <a:rPr lang="fr-FR" sz="1800" dirty="0" smtClean="0"/>
+              <a:t>)</a:t>
+            </a:r>
+          </a:p>
+          <a:p>
+            <a:r>
+              <a:rPr lang="fr-FR" sz="2600" dirty="0" smtClean="0"/>
+              <a:t>Il faudrait voir la profondeur de la prédiction (dérive du modèle) </a:t>
+            </a:r>
+            <a:endParaRPr lang="fr-FR" sz="2600" dirty="0"/>
           </a:p>
           <a:p>
             <a:pPr lvl="1"/>
@@ -13316,8 +13451,8 @@
         </p:blipFill>
         <p:spPr bwMode="auto">
           <a:xfrm>
-            <a:off x="1304925" y="2261989"/>
-            <a:ext cx="6534150" cy="885825"/>
+            <a:off x="3995936" y="2582607"/>
+            <a:ext cx="5067275" cy="686963"/>
           </a:xfrm>
           <a:prstGeom prst="rect">
             <a:avLst/>
@@ -13668,6 +13803,234 @@
       </p:grpSpPr>
       <p:sp>
         <p:nvSpPr>
+          <p:cNvPr id="2" name="Content Placeholder 1"/>
+          <p:cNvSpPr>
+            <a:spLocks noGrp="1"/>
+          </p:cNvSpPr>
+          <p:nvPr>
+            <p:ph idx="1"/>
+          </p:nvPr>
+        </p:nvSpPr>
+        <p:spPr/>
+        <p:txBody>
+          <a:bodyPr/>
+          <a:lstStyle/>
+          <a:p>
+            <a:r>
+              <a:rPr lang="fr-FR" dirty="0" smtClean="0"/>
+              <a:t>Travailler avec Mongo DB apporte sécurité et flexibilité (jointure météo directe) </a:t>
+            </a:r>
+          </a:p>
+          <a:p>
+            <a:r>
+              <a:rPr lang="fr-FR" dirty="0" smtClean="0"/>
+              <a:t>Attention à la limitation en taille de document à 16Mo!</a:t>
+            </a:r>
+          </a:p>
+          <a:p>
+            <a:r>
+              <a:rPr lang="fr-FR" dirty="0" smtClean="0"/>
+              <a:t>Les données moyennées par heure paraissent plus facile à modéliser que celles d’origine (20min)</a:t>
+            </a:r>
+            <a:endParaRPr lang="en-US" dirty="0"/>
+          </a:p>
+        </p:txBody>
+      </p:sp>
+      <p:sp>
+        <p:nvSpPr>
+          <p:cNvPr id="3" name="Title 2"/>
+          <p:cNvSpPr>
+            <a:spLocks noGrp="1"/>
+          </p:cNvSpPr>
+          <p:nvPr>
+            <p:ph type="title"/>
+          </p:nvPr>
+        </p:nvSpPr>
+        <p:spPr/>
+        <p:txBody>
+          <a:bodyPr/>
+          <a:lstStyle/>
+          <a:p>
+            <a:r>
+              <a:rPr lang="fr-FR" dirty="0" smtClean="0"/>
+              <a:t>Remarques</a:t>
+            </a:r>
+            <a:endParaRPr lang="en-US" dirty="0"/>
+          </a:p>
+        </p:txBody>
+      </p:sp>
+    </p:spTree>
+    <p:extLst>
+      <p:ext uri="{BB962C8B-B14F-4D97-AF65-F5344CB8AC3E}">
+        <p14:creationId xmlns:p14="http://schemas.microsoft.com/office/powerpoint/2010/main" val="3863842717"/>
+      </p:ext>
+    </p:extLst>
+  </p:cSld>
+  <p:clrMapOvr>
+    <a:masterClrMapping/>
+  </p:clrMapOvr>
+</p:sld>
+</file>
+
+<file path=ppt/slides/slide27.xml><?xml version="1.0" encoding="utf-8"?>
+<p:sld xmlns:a="http://schemas.openxmlformats.org/drawingml/2006/main" xmlns:r="http://schemas.openxmlformats.org/officeDocument/2006/relationships" xmlns:p="http://schemas.openxmlformats.org/presentationml/2006/main">
+  <p:cSld>
+    <p:spTree>
+      <p:nvGrpSpPr>
+        <p:cNvPr id="1" name=""/>
+        <p:cNvGrpSpPr/>
+        <p:nvPr/>
+      </p:nvGrpSpPr>
+      <p:grpSpPr>
+        <a:xfrm>
+          <a:off x="0" y="0"/>
+          <a:ext cx="0" cy="0"/>
+          <a:chOff x="0" y="0"/>
+          <a:chExt cx="0" cy="0"/>
+        </a:xfrm>
+      </p:grpSpPr>
+      <p:sp>
+        <p:nvSpPr>
+          <p:cNvPr id="2" name="Content Placeholder 1"/>
+          <p:cNvSpPr>
+            <a:spLocks noGrp="1"/>
+          </p:cNvSpPr>
+          <p:nvPr>
+            <p:ph idx="1"/>
+          </p:nvPr>
+        </p:nvSpPr>
+        <p:spPr/>
+        <p:txBody>
+          <a:bodyPr>
+            <a:normAutofit lnSpcReduction="10000"/>
+          </a:bodyPr>
+          <a:lstStyle/>
+          <a:p>
+            <a:r>
+              <a:rPr lang="fr-FR" dirty="0" smtClean="0"/>
+              <a:t>Etendre les tests à d’autres stations</a:t>
+            </a:r>
+          </a:p>
+          <a:p>
+            <a:r>
+              <a:rPr lang="fr-FR" dirty="0" smtClean="0"/>
+              <a:t>Affiner l’optimisation des paramètres SVM</a:t>
+            </a:r>
+          </a:p>
+          <a:p>
+            <a:r>
+              <a:rPr lang="fr-FR" dirty="0" smtClean="0"/>
+              <a:t>Estimer l’apport de la météo dans la performance des modèles</a:t>
+            </a:r>
+          </a:p>
+          <a:p>
+            <a:r>
+              <a:rPr lang="fr-FR" dirty="0" smtClean="0"/>
+              <a:t>Tester </a:t>
+            </a:r>
+            <a:r>
+              <a:rPr lang="fr-FR" dirty="0" err="1" smtClean="0"/>
+              <a:t>bestgml</a:t>
+            </a:r>
+            <a:r>
+              <a:rPr lang="fr-FR" dirty="0" smtClean="0"/>
+              <a:t> sur les paramètres importants</a:t>
+            </a:r>
+          </a:p>
+          <a:p>
+            <a:r>
+              <a:rPr lang="fr-FR" dirty="0" smtClean="0"/>
+              <a:t>Inclure la visualisation (</a:t>
+            </a:r>
+            <a:r>
+              <a:rPr lang="fr-FR" dirty="0" err="1" smtClean="0"/>
+              <a:t>app</a:t>
+            </a:r>
+            <a:r>
+              <a:rPr lang="fr-FR" dirty="0" smtClean="0"/>
+              <a:t> </a:t>
+            </a:r>
+            <a:r>
+              <a:rPr lang="fr-FR" dirty="0" err="1" smtClean="0"/>
+              <a:t>Shiny</a:t>
+            </a:r>
+            <a:r>
+              <a:rPr lang="fr-FR" dirty="0" smtClean="0"/>
+              <a:t>)</a:t>
+            </a:r>
+          </a:p>
+          <a:p>
+            <a:r>
+              <a:rPr lang="fr-FR" dirty="0" smtClean="0"/>
+              <a:t>Etendre à la prévision du nombre </a:t>
+            </a:r>
+            <a:r>
+              <a:rPr lang="fr-FR" dirty="0" err="1" smtClean="0"/>
+              <a:t>vélib</a:t>
+            </a:r>
+            <a:r>
+              <a:rPr lang="fr-FR" dirty="0" smtClean="0"/>
+              <a:t> (plusieurs modalité, comptage ou régression)</a:t>
+            </a:r>
+            <a:endParaRPr lang="en-US" dirty="0"/>
+          </a:p>
+        </p:txBody>
+      </p:sp>
+      <p:sp>
+        <p:nvSpPr>
+          <p:cNvPr id="3" name="Title 2"/>
+          <p:cNvSpPr>
+            <a:spLocks noGrp="1"/>
+          </p:cNvSpPr>
+          <p:nvPr>
+            <p:ph type="title"/>
+          </p:nvPr>
+        </p:nvSpPr>
+        <p:spPr/>
+        <p:txBody>
+          <a:bodyPr/>
+          <a:lstStyle/>
+          <a:p>
+            <a:r>
+              <a:rPr lang="fr-FR" dirty="0" smtClean="0"/>
+              <a:t>Perspectives</a:t>
+            </a:r>
+            <a:endParaRPr lang="en-US" dirty="0"/>
+          </a:p>
+        </p:txBody>
+      </p:sp>
+    </p:spTree>
+    <p:extLst>
+      <p:ext uri="{BB962C8B-B14F-4D97-AF65-F5344CB8AC3E}">
+        <p14:creationId xmlns:p14="http://schemas.microsoft.com/office/powerpoint/2010/main" val="622850526"/>
+      </p:ext>
+    </p:extLst>
+  </p:cSld>
+  <p:clrMapOvr>
+    <a:masterClrMapping/>
+  </p:clrMapOvr>
+</p:sld>
+</file>
+
+<file path=ppt/slides/slide28.xml><?xml version="1.0" encoding="utf-8"?>
+<p:sld xmlns:a="http://schemas.openxmlformats.org/drawingml/2006/main" xmlns:r="http://schemas.openxmlformats.org/officeDocument/2006/relationships" xmlns:p="http://schemas.openxmlformats.org/presentationml/2006/main">
+  <p:cSld>
+    <p:spTree>
+      <p:nvGrpSpPr>
+        <p:cNvPr id="1" name=""/>
+        <p:cNvGrpSpPr/>
+        <p:nvPr/>
+      </p:nvGrpSpPr>
+      <p:grpSpPr>
+        <a:xfrm>
+          <a:off x="0" y="0"/>
+          <a:ext cx="0" cy="0"/>
+          <a:chOff x="0" y="0"/>
+          <a:chExt cx="0" cy="0"/>
+        </a:xfrm>
+      </p:grpSpPr>
+      <p:sp>
+        <p:nvSpPr>
           <p:cNvPr id="2" name="Title 1"/>
           <p:cNvSpPr>
             <a:spLocks noGrp="1"/>
@@ -13711,7 +14074,7 @@
           <a:graphicData uri="http://schemas.openxmlformats.org/presentationml/2006/ole">
             <mc:AlternateContent xmlns:mc="http://schemas.openxmlformats.org/markup-compatibility/2006">
               <mc:Choice xmlns:v="urn:schemas-microsoft-com:vml" Requires="v">
-                <p:oleObj spid="_x0000_s2054" name="Worksheet" r:id="rId3" imgW="2447851" imgH="1152630" progId="Excel.Sheet.12">
+                <p:oleObj spid="_x0000_s2078" name="Worksheet" r:id="rId3" imgW="2447851" imgH="1152630" progId="Excel.Sheet.12">
                   <p:embed/>
                 </p:oleObj>
               </mc:Choice>
@@ -13768,7 +14131,7 @@
           <a:graphicData uri="http://schemas.openxmlformats.org/presentationml/2006/ole">
             <mc:AlternateContent xmlns:mc="http://schemas.openxmlformats.org/markup-compatibility/2006">
               <mc:Choice xmlns:v="urn:schemas-microsoft-com:vml" Requires="v">
-                <p:oleObj spid="_x0000_s2055" name="Worksheet" r:id="rId5" imgW="2447851" imgH="390420" progId="Excel.Sheet.12">
+                <p:oleObj spid="_x0000_s2079" name="Worksheet" r:id="rId5" imgW="2447851" imgH="390420" progId="Excel.Sheet.12">
                   <p:embed/>
                 </p:oleObj>
               </mc:Choice>
@@ -13825,7 +14188,7 @@
           <a:graphicData uri="http://schemas.openxmlformats.org/presentationml/2006/ole">
             <mc:AlternateContent xmlns:mc="http://schemas.openxmlformats.org/markup-compatibility/2006">
               <mc:Choice xmlns:v="urn:schemas-microsoft-com:vml" Requires="v">
-                <p:oleObj spid="_x0000_s2056" name="Worksheet" r:id="rId7" imgW="2447851" imgH="390420" progId="Excel.Sheet.12">
+                <p:oleObj spid="_x0000_s2080" name="Worksheet" r:id="rId7" imgW="2447851" imgH="390420" progId="Excel.Sheet.12">
                   <p:embed/>
                 </p:oleObj>
               </mc:Choice>
@@ -14006,7 +14369,7 @@
           <a:graphicData uri="http://schemas.openxmlformats.org/presentationml/2006/ole">
             <mc:AlternateContent xmlns:mc="http://schemas.openxmlformats.org/markup-compatibility/2006">
               <mc:Choice xmlns:v="urn:schemas-microsoft-com:vml" Requires="v">
-                <p:oleObj spid="_x0000_s2057" name="Worksheet" r:id="rId9" imgW="2447851" imgH="771660" progId="Excel.Sheet.12">
+                <p:oleObj spid="_x0000_s2081" name="Worksheet" r:id="rId9" imgW="2447851" imgH="771660" progId="Excel.Sheet.12">
                   <p:embed/>
                 </p:oleObj>
               </mc:Choice>
@@ -14091,7 +14454,7 @@
 </p:sld>
 </file>
 
-<file path=ppt/slides/slide27.xml><?xml version="1.0" encoding="utf-8"?>
+<file path=ppt/slides/slide29.xml><?xml version="1.0" encoding="utf-8"?>
 <p:sld xmlns:a="http://schemas.openxmlformats.org/drawingml/2006/main" xmlns:r="http://schemas.openxmlformats.org/officeDocument/2006/relationships" xmlns:p="http://schemas.openxmlformats.org/presentationml/2006/main">
   <p:cSld>
     <p:spTree>
@@ -14318,10 +14681,215 @@
   <p:clrMapOvr>
     <a:masterClrMapping/>
   </p:clrMapOvr>
+  <p:timing>
+    <p:tnLst>
+      <p:par>
+        <p:cTn id="1" dur="indefinite" restart="never" nodeType="tmRoot"/>
+      </p:par>
+    </p:tnLst>
+  </p:timing>
 </p:sld>
 </file>
 
-<file path=ppt/slides/slide28.xml><?xml version="1.0" encoding="utf-8"?>
+<file path=ppt/slides/slide3.xml><?xml version="1.0" encoding="utf-8"?>
+<p:sld xmlns:a="http://schemas.openxmlformats.org/drawingml/2006/main" xmlns:r="http://schemas.openxmlformats.org/officeDocument/2006/relationships" xmlns:p="http://schemas.openxmlformats.org/presentationml/2006/main">
+  <p:cSld>
+    <p:spTree>
+      <p:nvGrpSpPr>
+        <p:cNvPr id="1" name=""/>
+        <p:cNvGrpSpPr/>
+        <p:nvPr/>
+      </p:nvGrpSpPr>
+      <p:grpSpPr>
+        <a:xfrm>
+          <a:off x="0" y="0"/>
+          <a:ext cx="0" cy="0"/>
+          <a:chOff x="0" y="0"/>
+          <a:chExt cx="0" cy="0"/>
+        </a:xfrm>
+      </p:grpSpPr>
+      <p:sp>
+        <p:nvSpPr>
+          <p:cNvPr id="3" name="Content Placeholder 2"/>
+          <p:cNvSpPr>
+            <a:spLocks noGrp="1"/>
+          </p:cNvSpPr>
+          <p:nvPr>
+            <p:ph idx="1"/>
+          </p:nvPr>
+        </p:nvSpPr>
+        <p:spPr>
+          <a:xfrm>
+            <a:off x="323528" y="1059582"/>
+            <a:ext cx="8229600" cy="3528392"/>
+          </a:xfrm>
+        </p:spPr>
+        <p:txBody>
+          <a:bodyPr>
+            <a:normAutofit fontScale="85000" lnSpcReduction="20000"/>
+          </a:bodyPr>
+          <a:lstStyle/>
+          <a:p>
+            <a:r>
+              <a:rPr lang="fr-FR" sz="2400" dirty="0" smtClean="0"/>
+              <a:t>Stockage</a:t>
+            </a:r>
+          </a:p>
+          <a:p>
+            <a:pPr lvl="1"/>
+            <a:r>
+              <a:rPr lang="fr-FR" sz="2000" dirty="0" smtClean="0"/>
+              <a:t>Différentes structures de base testées (par station, sous-collection, etc.)</a:t>
+            </a:r>
+          </a:p>
+          <a:p>
+            <a:pPr lvl="1"/>
+            <a:r>
+              <a:rPr lang="fr-FR" sz="2000" dirty="0" smtClean="0"/>
+              <a:t>Difficultés:</a:t>
+            </a:r>
+          </a:p>
+          <a:p>
+            <a:pPr lvl="2"/>
+            <a:r>
+              <a:rPr lang="fr-FR" sz="1800" dirty="0" smtClean="0"/>
+              <a:t>Consommateur de temps</a:t>
+            </a:r>
+          </a:p>
+          <a:p>
+            <a:pPr lvl="2"/>
+            <a:r>
+              <a:rPr lang="fr-FR" sz="1800" dirty="0" smtClean="0"/>
+              <a:t>Limites de </a:t>
+            </a:r>
+            <a:r>
+              <a:rPr lang="fr-FR" sz="1800" dirty="0" err="1" smtClean="0"/>
+              <a:t>MongoDb</a:t>
+            </a:r>
+            <a:r>
+              <a:rPr lang="fr-FR" sz="1800" dirty="0" smtClean="0"/>
+              <a:t> pour le stockage en sous-collection</a:t>
+            </a:r>
+          </a:p>
+          <a:p>
+            <a:pPr marL="630936" lvl="2" indent="0">
+              <a:buNone/>
+            </a:pPr>
+            <a:endParaRPr lang="fr-FR" sz="1800" dirty="0" smtClean="0"/>
+          </a:p>
+          <a:p>
+            <a:r>
+              <a:rPr lang="fr-FR" sz="2400" dirty="0" smtClean="0"/>
+              <a:t>Ingestion temps réel:</a:t>
+            </a:r>
+          </a:p>
+          <a:p>
+            <a:pPr lvl="1"/>
+            <a:r>
+              <a:rPr lang="fr-FR" sz="2000" dirty="0" err="1" smtClean="0"/>
+              <a:t>Cron</a:t>
+            </a:r>
+            <a:r>
+              <a:rPr lang="fr-FR" sz="2000" dirty="0" smtClean="0"/>
+              <a:t> (linux) avec script appelant </a:t>
+            </a:r>
+            <a:r>
+              <a:rPr lang="fr-FR" sz="2000" dirty="0" err="1" smtClean="0"/>
+              <a:t>RScript</a:t>
+            </a:r>
+            <a:endParaRPr lang="fr-FR" sz="2000" dirty="0" smtClean="0"/>
+          </a:p>
+          <a:p>
+            <a:pPr lvl="1"/>
+            <a:r>
+              <a:rPr lang="fr-FR" sz="2000" dirty="0" smtClean="0"/>
+              <a:t>Difficultés:</a:t>
+            </a:r>
+          </a:p>
+          <a:p>
+            <a:pPr lvl="2"/>
+            <a:r>
+              <a:rPr lang="fr-FR" sz="1800" dirty="0" smtClean="0"/>
+              <a:t>Droits utilisateur</a:t>
+            </a:r>
+          </a:p>
+          <a:p>
+            <a:pPr lvl="2"/>
+            <a:r>
+              <a:rPr lang="fr-FR" sz="1800" dirty="0" smtClean="0"/>
+              <a:t>Chemin d’accès et utilisation de .</a:t>
+            </a:r>
+            <a:r>
+              <a:rPr lang="fr-FR" sz="1800" dirty="0" err="1" smtClean="0"/>
+              <a:t>Rprofile</a:t>
+            </a:r>
+            <a:r>
+              <a:rPr lang="fr-FR" sz="1800" dirty="0" smtClean="0"/>
+              <a:t> pour les </a:t>
+            </a:r>
+            <a:r>
+              <a:rPr lang="fr-FR" sz="1800" dirty="0" err="1" smtClean="0"/>
+              <a:t>mdp</a:t>
+            </a:r>
+            <a:endParaRPr lang="fr-FR" sz="1800" dirty="0" smtClean="0"/>
+          </a:p>
+          <a:p>
+            <a:pPr lvl="2"/>
+            <a:r>
+              <a:rPr lang="fr-FR" sz="1800" dirty="0" smtClean="0"/>
+              <a:t>Gestion des doublons de données</a:t>
+            </a:r>
+          </a:p>
+          <a:p>
+            <a:pPr lvl="1"/>
+            <a:endParaRPr lang="fr-FR" dirty="0"/>
+          </a:p>
+        </p:txBody>
+      </p:sp>
+      <p:sp>
+        <p:nvSpPr>
+          <p:cNvPr id="2" name="Title 1"/>
+          <p:cNvSpPr>
+            <a:spLocks noGrp="1"/>
+          </p:cNvSpPr>
+          <p:nvPr>
+            <p:ph type="title"/>
+          </p:nvPr>
+        </p:nvSpPr>
+        <p:spPr/>
+        <p:txBody>
+          <a:bodyPr/>
+          <a:lstStyle/>
+          <a:p>
+            <a:r>
+              <a:rPr lang="fr-FR" dirty="0" smtClean="0"/>
+              <a:t>Stockage &amp; ingestion</a:t>
+            </a:r>
+            <a:endParaRPr lang="fr-FR" dirty="0"/>
+          </a:p>
+        </p:txBody>
+      </p:sp>
+    </p:spTree>
+    <p:extLst>
+      <p:ext uri="{BB962C8B-B14F-4D97-AF65-F5344CB8AC3E}">
+        <p14:creationId xmlns:p14="http://schemas.microsoft.com/office/powerpoint/2010/main" val="4106289712"/>
+      </p:ext>
+    </p:extLst>
+  </p:cSld>
+  <p:clrMapOvr>
+    <a:masterClrMapping/>
+  </p:clrMapOvr>
+  <p:timing>
+    <p:tnLst>
+      <p:par>
+        <p:cTn id="1" dur="indefinite" restart="never" nodeType="tmRoot"/>
+      </p:par>
+    </p:tnLst>
+  </p:timing>
+</p:sld>
+</file>
+
+<file path=ppt/slides/slide30.xml><?xml version="1.0" encoding="utf-8"?>
 <p:sld xmlns:a="http://schemas.openxmlformats.org/drawingml/2006/main" xmlns:r="http://schemas.openxmlformats.org/officeDocument/2006/relationships" xmlns:p="http://schemas.openxmlformats.org/presentationml/2006/main">
   <p:cSld>
     <p:spTree>
@@ -14538,197 +15106,6 @@
     <p:extLst>
       <p:ext uri="{BB962C8B-B14F-4D97-AF65-F5344CB8AC3E}">
         <p14:creationId xmlns:p14="http://schemas.microsoft.com/office/powerpoint/2010/main" val="502061132"/>
-      </p:ext>
-    </p:extLst>
-  </p:cSld>
-  <p:clrMapOvr>
-    <a:masterClrMapping/>
-  </p:clrMapOvr>
-</p:sld>
-</file>
-
-<file path=ppt/slides/slide3.xml><?xml version="1.0" encoding="utf-8"?>
-<p:sld xmlns:a="http://schemas.openxmlformats.org/drawingml/2006/main" xmlns:r="http://schemas.openxmlformats.org/officeDocument/2006/relationships" xmlns:p="http://schemas.openxmlformats.org/presentationml/2006/main">
-  <p:cSld>
-    <p:spTree>
-      <p:nvGrpSpPr>
-        <p:cNvPr id="1" name=""/>
-        <p:cNvGrpSpPr/>
-        <p:nvPr/>
-      </p:nvGrpSpPr>
-      <p:grpSpPr>
-        <a:xfrm>
-          <a:off x="0" y="0"/>
-          <a:ext cx="0" cy="0"/>
-          <a:chOff x="0" y="0"/>
-          <a:chExt cx="0" cy="0"/>
-        </a:xfrm>
-      </p:grpSpPr>
-      <p:sp>
-        <p:nvSpPr>
-          <p:cNvPr id="3" name="Content Placeholder 2"/>
-          <p:cNvSpPr>
-            <a:spLocks noGrp="1"/>
-          </p:cNvSpPr>
-          <p:nvPr>
-            <p:ph idx="1"/>
-          </p:nvPr>
-        </p:nvSpPr>
-        <p:spPr>
-          <a:xfrm>
-            <a:off x="323528" y="1059582"/>
-            <a:ext cx="8229600" cy="3528392"/>
-          </a:xfrm>
-        </p:spPr>
-        <p:txBody>
-          <a:bodyPr>
-            <a:normAutofit fontScale="85000" lnSpcReduction="20000"/>
-          </a:bodyPr>
-          <a:lstStyle/>
-          <a:p>
-            <a:r>
-              <a:rPr lang="fr-FR" sz="2400" dirty="0" smtClean="0"/>
-              <a:t>Stockage</a:t>
-            </a:r>
-          </a:p>
-          <a:p>
-            <a:pPr lvl="1"/>
-            <a:r>
-              <a:rPr lang="fr-FR" sz="2000" dirty="0" smtClean="0"/>
-              <a:t>Différentes structures de base testées (par station, sous-collection, etc.)</a:t>
-            </a:r>
-          </a:p>
-          <a:p>
-            <a:pPr lvl="1"/>
-            <a:r>
-              <a:rPr lang="fr-FR" sz="2000" dirty="0" smtClean="0"/>
-              <a:t>Difficultés:</a:t>
-            </a:r>
-          </a:p>
-          <a:p>
-            <a:pPr lvl="2"/>
-            <a:r>
-              <a:rPr lang="fr-FR" sz="1800" dirty="0" smtClean="0"/>
-              <a:t>Consommateur de temps</a:t>
-            </a:r>
-          </a:p>
-          <a:p>
-            <a:pPr lvl="2"/>
-            <a:r>
-              <a:rPr lang="fr-FR" sz="1800" dirty="0" smtClean="0"/>
-              <a:t>Limites de </a:t>
-            </a:r>
-            <a:r>
-              <a:rPr lang="fr-FR" sz="1800" dirty="0" err="1" smtClean="0"/>
-              <a:t>MongoDb</a:t>
-            </a:r>
-            <a:r>
-              <a:rPr lang="fr-FR" sz="1800" dirty="0" smtClean="0"/>
-              <a:t> pour le stockage en sous-collection</a:t>
-            </a:r>
-          </a:p>
-          <a:p>
-            <a:pPr marL="630936" lvl="2" indent="0">
-              <a:buNone/>
-            </a:pPr>
-            <a:endParaRPr lang="fr-FR" sz="1800" dirty="0" smtClean="0"/>
-          </a:p>
-          <a:p>
-            <a:r>
-              <a:rPr lang="fr-FR" sz="2400" dirty="0" smtClean="0"/>
-              <a:t>Ingestion temps réel:</a:t>
-            </a:r>
-          </a:p>
-          <a:p>
-            <a:pPr lvl="1"/>
-            <a:r>
-              <a:rPr lang="fr-FR" sz="2000" dirty="0" err="1" smtClean="0"/>
-              <a:t>Cron</a:t>
-            </a:r>
-            <a:r>
-              <a:rPr lang="fr-FR" sz="2000" dirty="0" smtClean="0"/>
-              <a:t> (linux) avec script appelant </a:t>
-            </a:r>
-            <a:r>
-              <a:rPr lang="fr-FR" sz="2000" dirty="0" err="1" smtClean="0"/>
-              <a:t>RScript</a:t>
-            </a:r>
-            <a:endParaRPr lang="fr-FR" sz="2000" dirty="0" smtClean="0"/>
-          </a:p>
-          <a:p>
-            <a:pPr lvl="1"/>
-            <a:r>
-              <a:rPr lang="fr-FR" sz="2000" dirty="0" smtClean="0"/>
-              <a:t>Difficultés:</a:t>
-            </a:r>
-          </a:p>
-          <a:p>
-            <a:pPr lvl="2"/>
-            <a:r>
-              <a:rPr lang="fr-FR" sz="1800" dirty="0" smtClean="0"/>
-              <a:t>Droits utilisateur</a:t>
-            </a:r>
-          </a:p>
-          <a:p>
-            <a:pPr lvl="2"/>
-            <a:r>
-              <a:rPr lang="fr-FR" sz="1800" dirty="0" smtClean="0"/>
-              <a:t>Chemin d’accès et utilisation de .</a:t>
-            </a:r>
-            <a:r>
-              <a:rPr lang="fr-FR" sz="1800" dirty="0" err="1" smtClean="0"/>
-              <a:t>Rprofile</a:t>
-            </a:r>
-            <a:r>
-              <a:rPr lang="fr-FR" sz="1800" dirty="0" smtClean="0"/>
-              <a:t> pour les </a:t>
-            </a:r>
-            <a:r>
-              <a:rPr lang="fr-FR" sz="1800" dirty="0" err="1" smtClean="0"/>
-              <a:t>mdp</a:t>
-            </a:r>
-            <a:endParaRPr lang="fr-FR" sz="1800" dirty="0" smtClean="0"/>
-          </a:p>
-          <a:p>
-            <a:pPr lvl="2"/>
-            <a:r>
-              <a:rPr lang="fr-FR" sz="1800" dirty="0" smtClean="0"/>
-              <a:t>Gestion des doublons de données</a:t>
-            </a:r>
-          </a:p>
-          <a:p>
-            <a:pPr lvl="1"/>
-            <a:endParaRPr lang="fr-FR" dirty="0"/>
-          </a:p>
-        </p:txBody>
-      </p:sp>
-      <p:sp>
-        <p:nvSpPr>
-          <p:cNvPr id="2" name="Title 1"/>
-          <p:cNvSpPr>
-            <a:spLocks noGrp="1"/>
-          </p:cNvSpPr>
-          <p:nvPr>
-            <p:ph type="title"/>
-          </p:nvPr>
-        </p:nvSpPr>
-        <p:spPr/>
-        <p:txBody>
-          <a:bodyPr/>
-          <a:lstStyle/>
-          <a:p>
-            <a:r>
-              <a:rPr lang="fr-FR" dirty="0" smtClean="0"/>
-              <a:t>Stockage &amp; ingestion</a:t>
-            </a:r>
-            <a:endParaRPr lang="fr-FR" dirty="0"/>
-          </a:p>
-        </p:txBody>
-      </p:sp>
-    </p:spTree>
-    <p:extLst>
-      <p:ext uri="{BB962C8B-B14F-4D97-AF65-F5344CB8AC3E}">
-        <p14:creationId xmlns:p14="http://schemas.microsoft.com/office/powerpoint/2010/main" val="4106289712"/>
       </p:ext>
     </p:extLst>
   </p:cSld>
@@ -18009,10 +18386,10 @@
           <a:p>
             <a:pPr algn="ctr"/>
             <a:r>
-              <a:rPr lang="fr-FR" dirty="0" smtClean="0"/>
+              <a:rPr lang="fr-FR" sz="1400" dirty="0" smtClean="0"/>
               <a:t>Jour de la semaine de J &amp; J+1</a:t>
             </a:r>
-            <a:endParaRPr lang="en-US" dirty="0"/>
+            <a:endParaRPr lang="en-US" sz="1400" dirty="0"/>
           </a:p>
         </p:txBody>
       </p:sp>
@@ -18361,24 +18738,24 @@
             <a:p>
               <a:pPr algn="ctr"/>
               <a:r>
-                <a:rPr lang="fr-FR" dirty="0" smtClean="0"/>
+                <a:rPr lang="fr-FR" sz="1600" dirty="0" smtClean="0"/>
                 <a:t>Mise en forme</a:t>
               </a:r>
             </a:p>
             <a:p>
               <a:pPr algn="ctr"/>
               <a:r>
-                <a:rPr lang="fr-FR" dirty="0" smtClean="0"/>
+                <a:rPr lang="fr-FR" sz="1600" dirty="0" smtClean="0"/>
                 <a:t>des données</a:t>
               </a:r>
               <a:br>
-                <a:rPr lang="fr-FR" dirty="0" smtClean="0"/>
+                <a:rPr lang="fr-FR" sz="1600" dirty="0" smtClean="0"/>
               </a:br>
               <a:r>
-                <a:rPr lang="fr-FR" dirty="0" smtClean="0"/>
+                <a:rPr lang="fr-FR" sz="1600" dirty="0" smtClean="0"/>
                 <a:t>pour la modélisation</a:t>
               </a:r>
-              <a:endParaRPr lang="en-US" sz="1200" dirty="0"/>
+              <a:endParaRPr lang="en-US" sz="1100" dirty="0"/>
             </a:p>
           </p:txBody>
         </p:sp>
@@ -18983,10 +19360,10 @@
             <a:p>
               <a:pPr algn="ctr"/>
               <a:r>
-                <a:rPr lang="fr-FR" dirty="0" smtClean="0"/>
+                <a:rPr lang="fr-FR" sz="1400" dirty="0" smtClean="0"/>
                 <a:t>Moyenne par heure</a:t>
               </a:r>
-              <a:endParaRPr lang="en-US" dirty="0"/>
+              <a:endParaRPr lang="en-US" sz="1400" dirty="0"/>
             </a:p>
           </p:txBody>
         </p:sp>
@@ -19033,24 +19410,24 @@
             <a:p>
               <a:pPr algn="ctr"/>
               <a:r>
-                <a:rPr lang="fr-FR" dirty="0" smtClean="0"/>
+                <a:rPr lang="fr-FR" sz="1400" dirty="0" smtClean="0"/>
                 <a:t>Ajout colonnes</a:t>
               </a:r>
             </a:p>
             <a:p>
               <a:pPr algn="ctr"/>
               <a:r>
-                <a:rPr lang="fr-FR" dirty="0" smtClean="0"/>
+                <a:rPr lang="fr-FR" sz="1400" dirty="0" smtClean="0"/>
                 <a:t>h-X</a:t>
               </a:r>
             </a:p>
             <a:p>
               <a:pPr algn="ctr"/>
               <a:r>
-                <a:rPr lang="fr-FR" dirty="0" smtClean="0"/>
+                <a:rPr lang="fr-FR" sz="1400" dirty="0" smtClean="0"/>
                 <a:t>j-7</a:t>
               </a:r>
-              <a:endParaRPr lang="en-US" dirty="0"/>
+              <a:endParaRPr lang="en-US" sz="1400" dirty="0"/>
             </a:p>
           </p:txBody>
         </p:sp>
@@ -19139,7 +19516,7 @@
             <a:p>
               <a:pPr algn="ctr"/>
               <a:r>
-                <a:rPr lang="fr-FR" dirty="0" smtClean="0"/>
+                <a:rPr lang="fr-FR" sz="1400" dirty="0" smtClean="0"/>
                 <a:t>Séparation données</a:t>
               </a:r>
             </a:p>
@@ -19149,14 +19526,14 @@
                 <a:buChar char="§"/>
               </a:pPr>
               <a:r>
-                <a:rPr lang="fr-FR" dirty="0" smtClean="0"/>
+                <a:rPr lang="fr-FR" sz="1400" dirty="0" smtClean="0"/>
                 <a:t>pré:   t&lt;</a:t>
               </a:r>
               <a:r>
-                <a:rPr lang="fr-FR" dirty="0" err="1" smtClean="0"/>
+                <a:rPr lang="fr-FR" sz="1400" dirty="0" err="1" smtClean="0"/>
                 <a:t>Date+H</a:t>
               </a:r>
-              <a:endParaRPr lang="fr-FR" dirty="0" smtClean="0"/>
+              <a:endParaRPr lang="fr-FR" sz="1400" dirty="0" smtClean="0"/>
             </a:p>
             <a:p>
               <a:pPr marL="285750" indent="-285750">
@@ -19164,14 +19541,14 @@
                 <a:buChar char="§"/>
               </a:pPr>
               <a:r>
-                <a:rPr lang="fr-FR" dirty="0" smtClean="0"/>
+                <a:rPr lang="fr-FR" sz="1400" dirty="0" smtClean="0"/>
                 <a:t>post: t&gt;</a:t>
               </a:r>
               <a:r>
-                <a:rPr lang="fr-FR" dirty="0" err="1" smtClean="0"/>
+                <a:rPr lang="fr-FR" sz="1400" dirty="0" err="1" smtClean="0"/>
                 <a:t>Date+H</a:t>
               </a:r>
-              <a:endParaRPr lang="en-US" dirty="0"/>
+              <a:endParaRPr lang="en-US" sz="1400" dirty="0"/>
             </a:p>
           </p:txBody>
         </p:sp>

</xml_diff>